<commit_message>
Minor additions : - slide added - weights formula added to the docx
</commit_message>
<xml_diff>
--- a/Project Presentation.pptx
+++ b/Project Presentation.pptx
@@ -218,7 +218,7 @@
           <a:p>
             <a:fld id="{C3FD74BF-9CD9-4A85-A347-CE1D6B3476A9}" type="datetimeFigureOut">
               <a:rPr lang="en-US" smtClean="0"/>
-              <a:t>17-Sep-21</a:t>
+              <a:t>9/20/2021</a:t>
             </a:fld>
             <a:endParaRPr lang="en-US"/>
           </a:p>
@@ -796,7 +796,7 @@
           <a:p>
             <a:fld id="{F859EC29-AB51-4235-93D7-D93A9A0D5173}" type="datetimeFigureOut">
               <a:rPr lang="en-US" smtClean="0"/>
-              <a:t>17-Sep-21</a:t>
+              <a:t>9/20/2021</a:t>
             </a:fld>
             <a:endParaRPr lang="en-US"/>
           </a:p>
@@ -1004,7 +1004,7 @@
           <a:p>
             <a:fld id="{F859EC29-AB51-4235-93D7-D93A9A0D5173}" type="datetimeFigureOut">
               <a:rPr lang="en-US" smtClean="0"/>
-              <a:t>17-Sep-21</a:t>
+              <a:t>9/20/2021</a:t>
             </a:fld>
             <a:endParaRPr lang="en-US"/>
           </a:p>
@@ -1260,7 +1260,7 @@
           <a:p>
             <a:fld id="{F859EC29-AB51-4235-93D7-D93A9A0D5173}" type="datetimeFigureOut">
               <a:rPr lang="en-US" smtClean="0"/>
-              <a:t>17-Sep-21</a:t>
+              <a:t>9/20/2021</a:t>
             </a:fld>
             <a:endParaRPr lang="en-US"/>
           </a:p>
@@ -1434,7 +1434,7 @@
           <a:p>
             <a:fld id="{F859EC29-AB51-4235-93D7-D93A9A0D5173}" type="datetimeFigureOut">
               <a:rPr lang="en-US" smtClean="0"/>
-              <a:t>17-Sep-21</a:t>
+              <a:t>9/20/2021</a:t>
             </a:fld>
             <a:endParaRPr lang="en-US"/>
           </a:p>
@@ -1777,7 +1777,7 @@
           <a:p>
             <a:fld id="{F859EC29-AB51-4235-93D7-D93A9A0D5173}" type="datetimeFigureOut">
               <a:rPr lang="en-US" smtClean="0"/>
-              <a:t>17-Sep-21</a:t>
+              <a:t>9/20/2021</a:t>
             </a:fld>
             <a:endParaRPr lang="en-US"/>
           </a:p>
@@ -2052,7 +2052,7 @@
           <a:p>
             <a:fld id="{F859EC29-AB51-4235-93D7-D93A9A0D5173}" type="datetimeFigureOut">
               <a:rPr lang="en-US" smtClean="0"/>
-              <a:t>17-Sep-21</a:t>
+              <a:t>9/20/2021</a:t>
             </a:fld>
             <a:endParaRPr lang="en-US"/>
           </a:p>
@@ -2431,7 +2431,7 @@
           <a:p>
             <a:fld id="{F859EC29-AB51-4235-93D7-D93A9A0D5173}" type="datetimeFigureOut">
               <a:rPr lang="en-US" smtClean="0"/>
-              <a:t>17-Sep-21</a:t>
+              <a:t>9/20/2021</a:t>
             </a:fld>
             <a:endParaRPr lang="en-US"/>
           </a:p>
@@ -2549,7 +2549,7 @@
           <a:p>
             <a:fld id="{F859EC29-AB51-4235-93D7-D93A9A0D5173}" type="datetimeFigureOut">
               <a:rPr lang="en-US" smtClean="0"/>
-              <a:t>17-Sep-21</a:t>
+              <a:t>9/20/2021</a:t>
             </a:fld>
             <a:endParaRPr lang="en-US"/>
           </a:p>
@@ -2720,7 +2720,7 @@
           <a:p>
             <a:fld id="{F859EC29-AB51-4235-93D7-D93A9A0D5173}" type="datetimeFigureOut">
               <a:rPr lang="en-US" smtClean="0"/>
-              <a:t>17-Sep-21</a:t>
+              <a:t>9/20/2021</a:t>
             </a:fld>
             <a:endParaRPr lang="en-US"/>
           </a:p>
@@ -3074,7 +3074,7 @@
           <a:p>
             <a:fld id="{F859EC29-AB51-4235-93D7-D93A9A0D5173}" type="datetimeFigureOut">
               <a:rPr lang="en-US" smtClean="0"/>
-              <a:t>17-Sep-21</a:t>
+              <a:t>9/20/2021</a:t>
             </a:fld>
             <a:endParaRPr lang="en-US"/>
           </a:p>
@@ -3456,7 +3456,7 @@
           <a:p>
             <a:fld id="{F859EC29-AB51-4235-93D7-D93A9A0D5173}" type="datetimeFigureOut">
               <a:rPr lang="en-US" smtClean="0"/>
-              <a:t>17-Sep-21</a:t>
+              <a:t>9/20/2021</a:t>
             </a:fld>
             <a:endParaRPr lang="en-US"/>
           </a:p>
@@ -3743,7 +3743,7 @@
           <a:p>
             <a:fld id="{F859EC29-AB51-4235-93D7-D93A9A0D5173}" type="datetimeFigureOut">
               <a:rPr lang="en-US" smtClean="0"/>
-              <a:t>17-Sep-21</a:t>
+              <a:t>9/20/2021</a:t>
             </a:fld>
             <a:endParaRPr lang="en-US"/>
           </a:p>
@@ -22069,10 +22069,10 @@
       </p:sp>
       <p:pic>
         <p:nvPicPr>
-          <p:cNvPr id="4" name="Picture 4" descr="Text, letter&#10;&#10;Description automatically generated">
+          <p:cNvPr id="5" name="Picture 5" descr="Diagram&#10;&#10;Description automatically generated">
             <a:extLst>
               <a:ext uri="{FF2B5EF4-FFF2-40B4-BE49-F238E27FC236}">
-                <a16:creationId xmlns:a16="http://schemas.microsoft.com/office/drawing/2014/main" id="{D80EA506-AD60-4D4E-B986-C037365740A5}"/>
+                <a16:creationId xmlns:a16="http://schemas.microsoft.com/office/drawing/2014/main" id="{EFFC9D48-011A-4501-82B1-ABD62788F11D}"/>
               </a:ext>
             </a:extLst>
           </p:cNvPr>
@@ -22087,35 +22087,7 @@
         </p:blipFill>
         <p:spPr>
           <a:xfrm>
-            <a:off x="419869" y="2804317"/>
-            <a:ext cx="4131581" cy="3377822"/>
-          </a:xfrm>
-          <a:prstGeom prst="rect">
-            <a:avLst/>
-          </a:prstGeom>
-        </p:spPr>
-      </p:pic>
-      <p:pic>
-        <p:nvPicPr>
-          <p:cNvPr id="5" name="Picture 5" descr="Diagram&#10;&#10;Description automatically generated">
-            <a:extLst>
-              <a:ext uri="{FF2B5EF4-FFF2-40B4-BE49-F238E27FC236}">
-                <a16:creationId xmlns:a16="http://schemas.microsoft.com/office/drawing/2014/main" id="{EFFC9D48-011A-4501-82B1-ABD62788F11D}"/>
-              </a:ext>
-            </a:extLst>
-          </p:cNvPr>
-          <p:cNvPicPr/>
-          <p:nvPr/>
-        </p:nvPicPr>
-        <p:blipFill>
-          <a:blip r:embed="rId3"/>
-          <a:stretch>
-            <a:fillRect/>
-          </a:stretch>
-        </p:blipFill>
-        <p:spPr>
-          <a:xfrm>
-            <a:off x="5122724" y="2757057"/>
+            <a:off x="2965479" y="2747225"/>
             <a:ext cx="6261041" cy="3377822"/>
           </a:xfrm>
           <a:prstGeom prst="rect">
@@ -22169,7 +22141,13 @@
             <p:ph type="title"/>
           </p:nvPr>
         </p:nvSpPr>
-        <p:spPr/>
+        <p:spPr>
+          <a:ln>
+            <a:solidFill>
+              <a:schemeClr val="bg1"/>
+            </a:solidFill>
+          </a:ln>
+        </p:spPr>
         <p:txBody>
           <a:bodyPr>
             <a:normAutofit/>
@@ -22184,453 +22162,324 @@
           </a:p>
         </p:txBody>
       </p:sp>
-      <mc:AlternateContent xmlns:mc="http://schemas.openxmlformats.org/markup-compatibility/2006" xmlns:a14="http://schemas.microsoft.com/office/drawing/2010/main">
-        <mc:Choice Requires="a14">
+      <p:pic>
+        <p:nvPicPr>
+          <p:cNvPr id="19" name="Picture 3" descr="A picture containing text&#10;&#10;Description automatically generated">
+            <a:extLst>
+              <a:ext uri="{FF2B5EF4-FFF2-40B4-BE49-F238E27FC236}">
+                <a16:creationId xmlns:a16="http://schemas.microsoft.com/office/drawing/2014/main" id="{8AD84200-3298-4E39-A9BB-9DEB9B54327E}"/>
+              </a:ext>
+            </a:extLst>
+          </p:cNvPr>
+          <p:cNvPicPr/>
+          <p:nvPr/>
+        </p:nvPicPr>
+        <p:blipFill rotWithShape="1">
+          <a:blip r:embed="rId2"/>
+          <a:srcRect l="4625" t="15777" r="68729" b="11273"/>
+          <a:stretch/>
+        </p:blipFill>
+        <p:spPr>
+          <a:xfrm>
+            <a:off x="7211513" y="605389"/>
+            <a:ext cx="2787048" cy="2600444"/>
+          </a:xfrm>
+          <a:prstGeom prst="rect">
+            <a:avLst/>
+          </a:prstGeom>
+        </p:spPr>
+      </p:pic>
+      <p:sp>
+        <p:nvSpPr>
+          <p:cNvPr id="3" name="מציין מיקום תוכן 2">
+            <a:extLst>
+              <a:ext uri="{FF2B5EF4-FFF2-40B4-BE49-F238E27FC236}">
+                <a16:creationId xmlns:a16="http://schemas.microsoft.com/office/drawing/2014/main" id="{C36F00ED-786D-49AC-B981-CA0615B0391B}"/>
+              </a:ext>
+            </a:extLst>
+          </p:cNvPr>
+          <p:cNvSpPr>
+            <a:spLocks noGrp="1"/>
+          </p:cNvSpPr>
+          <p:nvPr>
+            <p:ph idx="1"/>
+          </p:nvPr>
+        </p:nvSpPr>
+        <p:spPr/>
+        <p:txBody>
+          <a:bodyPr/>
+          <a:lstStyle/>
+          <a:p>
+            <a:pPr algn="l" rtl="0"/>
+            <a:endParaRPr lang="en-US" dirty="0">
+              <a:highlight>
+                <a:srgbClr val="FFFF00"/>
+              </a:highlight>
+            </a:endParaRPr>
+          </a:p>
+          <a:p>
+            <a:pPr marL="0" indent="0" algn="l" rtl="0">
+              <a:buNone/>
+            </a:pPr>
+            <a:endParaRPr lang="en-US" dirty="0"/>
+          </a:p>
+        </p:txBody>
+      </p:sp>
+      <p:pic>
+        <p:nvPicPr>
+          <p:cNvPr id="4" name="Picture 4" descr="Text, letter&#10;&#10;Description automatically generated">
+            <a:extLst>
+              <a:ext uri="{FF2B5EF4-FFF2-40B4-BE49-F238E27FC236}">
+                <a16:creationId xmlns:a16="http://schemas.microsoft.com/office/drawing/2014/main" id="{68657EE3-DD09-4526-A38E-EBD0C4EE8A30}"/>
+              </a:ext>
+            </a:extLst>
+          </p:cNvPr>
+          <p:cNvPicPr/>
+          <p:nvPr/>
+        </p:nvPicPr>
+        <p:blipFill>
+          <a:blip r:embed="rId3"/>
+          <a:stretch>
+            <a:fillRect/>
+          </a:stretch>
+        </p:blipFill>
+        <p:spPr>
+          <a:xfrm>
+            <a:off x="1090156" y="2075216"/>
+            <a:ext cx="4131581" cy="3377822"/>
+          </a:xfrm>
+          <a:prstGeom prst="rect">
+            <a:avLst/>
+          </a:prstGeom>
+        </p:spPr>
+      </p:pic>
+      <p:cxnSp>
+        <p:nvCxnSpPr>
+          <p:cNvPr id="12" name="מחבר חץ ישר 11">
+            <a:extLst>
+              <a:ext uri="{FF2B5EF4-FFF2-40B4-BE49-F238E27FC236}">
+                <a16:creationId xmlns:a16="http://schemas.microsoft.com/office/drawing/2014/main" id="{68182BB4-FF94-4156-8536-F1971A80F6BF}"/>
+              </a:ext>
+            </a:extLst>
+          </p:cNvPr>
+          <p:cNvCxnSpPr>
+            <a:cxnSpLocks/>
+            <a:stCxn id="24" idx="1"/>
+          </p:cNvCxnSpPr>
+          <p:nvPr/>
+        </p:nvCxnSpPr>
+        <p:spPr>
+          <a:xfrm flipH="1">
+            <a:off x="8403771" y="436819"/>
+            <a:ext cx="2042883" cy="1417407"/>
+          </a:xfrm>
+          <a:prstGeom prst="straightConnector1">
+            <a:avLst/>
+          </a:prstGeom>
+          <a:ln w="28575">
+            <a:solidFill>
+              <a:schemeClr val="tx1">
+                <a:lumMod val="95000"/>
+                <a:lumOff val="5000"/>
+              </a:schemeClr>
+            </a:solidFill>
+            <a:tailEnd type="triangle"/>
+          </a:ln>
+        </p:spPr>
+        <p:style>
+          <a:lnRef idx="1">
+            <a:schemeClr val="dk1"/>
+          </a:lnRef>
+          <a:fillRef idx="0">
+            <a:schemeClr val="dk1"/>
+          </a:fillRef>
+          <a:effectRef idx="0">
+            <a:schemeClr val="dk1"/>
+          </a:effectRef>
+          <a:fontRef idx="minor">
+            <a:schemeClr val="tx1"/>
+          </a:fontRef>
+        </p:style>
+      </p:cxnSp>
+      <p:cxnSp>
+        <p:nvCxnSpPr>
+          <p:cNvPr id="15" name="מחבר חץ ישר 14">
+            <a:extLst>
+              <a:ext uri="{FF2B5EF4-FFF2-40B4-BE49-F238E27FC236}">
+                <a16:creationId xmlns:a16="http://schemas.microsoft.com/office/drawing/2014/main" id="{0C2D8BAB-E11F-41BD-9B3C-DB6C527B90FE}"/>
+              </a:ext>
+            </a:extLst>
+          </p:cNvPr>
+          <p:cNvCxnSpPr>
+            <a:cxnSpLocks/>
+            <a:stCxn id="22" idx="0"/>
+          </p:cNvCxnSpPr>
+          <p:nvPr/>
+        </p:nvCxnSpPr>
+        <p:spPr>
+          <a:xfrm flipH="1" flipV="1">
+            <a:off x="8033657" y="1737361"/>
+            <a:ext cx="370114" cy="1787258"/>
+          </a:xfrm>
+          <a:prstGeom prst="straightConnector1">
+            <a:avLst/>
+          </a:prstGeom>
+          <a:ln w="28575">
+            <a:solidFill>
+              <a:schemeClr val="tx1"/>
+            </a:solidFill>
+            <a:tailEnd type="triangle"/>
+          </a:ln>
+        </p:spPr>
+        <p:style>
+          <a:lnRef idx="1">
+            <a:schemeClr val="dk1"/>
+          </a:lnRef>
+          <a:fillRef idx="0">
+            <a:schemeClr val="dk1"/>
+          </a:fillRef>
+          <a:effectRef idx="0">
+            <a:schemeClr val="dk1"/>
+          </a:effectRef>
+          <a:fontRef idx="minor">
+            <a:schemeClr val="tx1"/>
+          </a:fontRef>
+        </p:style>
+      </p:cxnSp>
+      <mc:AlternateContent xmlns:mc="http://schemas.openxmlformats.org/markup-compatibility/2006">
+        <mc:Choice xmlns:a14="http://schemas.microsoft.com/office/drawing/2010/main" Requires="a14">
           <p:sp>
             <p:nvSpPr>
-              <p:cNvPr id="3" name="מציין מיקום תוכן 2">
+              <p:cNvPr id="22" name="תיבת טקסט 21">
                 <a:extLst>
                   <a:ext uri="{FF2B5EF4-FFF2-40B4-BE49-F238E27FC236}">
-                    <a16:creationId xmlns:a16="http://schemas.microsoft.com/office/drawing/2014/main" id="{C36F00ED-786D-49AC-B981-CA0615B0391B}"/>
+                    <a16:creationId xmlns:a16="http://schemas.microsoft.com/office/drawing/2014/main" id="{5C37BC17-A1E2-483C-A1AE-76FA855AD154}"/>
                   </a:ext>
                 </a:extLst>
               </p:cNvPr>
-              <p:cNvSpPr>
-                <a:spLocks noGrp="1"/>
-              </p:cNvSpPr>
-              <p:nvPr>
-                <p:ph idx="1"/>
-              </p:nvPr>
+              <p:cNvSpPr txBox="1"/>
+              <p:nvPr/>
             </p:nvSpPr>
-            <p:spPr/>
+            <p:spPr>
+              <a:xfrm>
+                <a:off x="7861980" y="3524619"/>
+                <a:ext cx="1083581" cy="391646"/>
+              </a:xfrm>
+              <a:prstGeom prst="rect">
+                <a:avLst/>
+              </a:prstGeom>
+              <a:noFill/>
+            </p:spPr>
             <p:txBody>
-              <a:bodyPr/>
+              <a:bodyPr wrap="square">
+                <a:spAutoFit/>
+              </a:bodyPr>
               <a:lstStyle/>
               <a:p>
-                <a:pPr algn="l" rtl="0"/>
-                <a:r>
-                  <a:rPr lang="en-US" dirty="0">
-                    <a:highlight>
-                      <a:srgbClr val="FFFF00"/>
-                    </a:highlight>
-                  </a:rPr>
-                  <a:t>TODO: add a diagram explaining each term of the equation</a:t>
-                </a:r>
-              </a:p>
-              <a:p>
-                <a:pPr algn="l" rtl="0"/>
+                <a:pPr/>
                 <a14:m>
-                  <m:oMath xmlns:m="http://schemas.openxmlformats.org/officeDocument/2006/math">
-                    <m:acc>
-                      <m:accPr>
-                        <m:chr m:val="̂"/>
-                        <m:ctrlPr>
-                          <a:rPr lang="en-US" sz="2000" b="1" i="1" smtClean="0">
-                            <a:effectLst/>
-                            <a:highlight>
-                              <a:srgbClr val="FFFF00"/>
-                            </a:highlight>
-                            <a:latin typeface="Cambria Math" panose="02040503050406030204" pitchFamily="18" charset="0"/>
-                            <a:ea typeface="Times New Roman" panose="02020603050405020304" pitchFamily="18" charset="0"/>
-                            <a:cs typeface="David" panose="020E0502060401010101" pitchFamily="34" charset="-79"/>
-                          </a:rPr>
-                        </m:ctrlPr>
-                      </m:accPr>
-                      <m:e>
-                        <m:r>
-                          <a:rPr lang="en-US" sz="2000" b="1" i="1">
-                            <a:effectLst/>
-                            <a:highlight>
-                              <a:srgbClr val="FFFF00"/>
-                            </a:highlight>
-                            <a:latin typeface="Cambria Math" panose="02040503050406030204" pitchFamily="18" charset="0"/>
-                            <a:ea typeface="Times New Roman" panose="02020603050405020304" pitchFamily="18" charset="0"/>
-                            <a:cs typeface="David" panose="020E0502060401010101" pitchFamily="34" charset="-79"/>
-                          </a:rPr>
-                          <m:t>𝑿</m:t>
-                        </m:r>
-                      </m:e>
-                    </m:acc>
-                    <m:r>
-                      <a:rPr lang="en-US" sz="2000" b="1" i="1">
-                        <a:effectLst/>
-                        <a:highlight>
-                          <a:srgbClr val="FFFF00"/>
-                        </a:highlight>
-                        <a:latin typeface="Cambria Math" panose="02040503050406030204" pitchFamily="18" charset="0"/>
-                        <a:ea typeface="Times New Roman" panose="02020603050405020304" pitchFamily="18" charset="0"/>
-                        <a:cs typeface="David" panose="020E0502060401010101" pitchFamily="34" charset="-79"/>
-                      </a:rPr>
-                      <m:t> =</m:t>
-                    </m:r>
-                    <m:r>
-                      <a:rPr lang="en-US" sz="2000" b="1" i="1">
-                        <a:effectLst/>
-                        <a:highlight>
-                          <a:srgbClr val="FFFF00"/>
-                        </a:highlight>
-                        <a:latin typeface="Cambria Math" panose="02040503050406030204" pitchFamily="18" charset="0"/>
-                        <a:ea typeface="Times New Roman" panose="02020603050405020304" pitchFamily="18" charset="0"/>
-                        <a:cs typeface="David" panose="020E0502060401010101" pitchFamily="34" charset="-79"/>
-                      </a:rPr>
-                      <m:t>𝒂𝒓𝒈𝒎𝒊</m:t>
-                    </m:r>
-                    <m:sSub>
-                      <m:sSubPr>
-                        <m:ctrlPr>
-                          <a:rPr lang="en-US" sz="2000" b="1" i="1">
-                            <a:effectLst/>
-                            <a:highlight>
-                              <a:srgbClr val="FFFF00"/>
-                            </a:highlight>
-                            <a:latin typeface="Cambria Math" panose="02040503050406030204" pitchFamily="18" charset="0"/>
-                            <a:ea typeface="Times New Roman" panose="02020603050405020304" pitchFamily="18" charset="0"/>
-                            <a:cs typeface="David" panose="020E0502060401010101" pitchFamily="34" charset="-79"/>
-                          </a:rPr>
-                        </m:ctrlPr>
-                      </m:sSubPr>
-                      <m:e>
-                        <m:r>
-                          <a:rPr lang="en-US" sz="2000" b="1" i="1">
-                            <a:effectLst/>
-                            <a:highlight>
-                              <a:srgbClr val="FFFF00"/>
-                            </a:highlight>
-                            <a:latin typeface="Cambria Math" panose="02040503050406030204" pitchFamily="18" charset="0"/>
-                            <a:ea typeface="Times New Roman" panose="02020603050405020304" pitchFamily="18" charset="0"/>
-                            <a:cs typeface="David" panose="020E0502060401010101" pitchFamily="34" charset="-79"/>
-                          </a:rPr>
-                          <m:t>𝒏</m:t>
-                        </m:r>
-                      </m:e>
-                      <m:sub>
-                        <m:r>
-                          <a:rPr lang="en-US" sz="2000" b="1" i="1" smtClean="0">
-                            <a:effectLst/>
-                            <a:highlight>
-                              <a:srgbClr val="FFFF00"/>
-                            </a:highlight>
-                            <a:latin typeface="Cambria Math" panose="02040503050406030204" pitchFamily="18" charset="0"/>
-                            <a:ea typeface="Times New Roman" panose="02020603050405020304" pitchFamily="18" charset="0"/>
-                            <a:cs typeface="David" panose="020E0502060401010101" pitchFamily="34" charset="-79"/>
-                          </a:rPr>
-                          <m:t>𝑿</m:t>
-                        </m:r>
-                      </m:sub>
-                    </m:sSub>
-                    <m:f>
-                      <m:fPr>
-                        <m:ctrlPr>
-                          <a:rPr lang="en-US" sz="2000" b="1" i="1">
-                            <a:effectLst/>
-                            <a:highlight>
-                              <a:srgbClr val="FFFF00"/>
-                            </a:highlight>
-                            <a:latin typeface="Cambria Math" panose="02040503050406030204" pitchFamily="18" charset="0"/>
-                            <a:ea typeface="Times New Roman" panose="02020603050405020304" pitchFamily="18" charset="0"/>
-                            <a:cs typeface="David" panose="020E0502060401010101" pitchFamily="34" charset="-79"/>
-                          </a:rPr>
-                        </m:ctrlPr>
-                      </m:fPr>
-                      <m:num>
-                        <m:r>
-                          <a:rPr lang="en-US" sz="2000" b="1" i="1">
-                            <a:effectLst/>
-                            <a:highlight>
-                              <a:srgbClr val="FFFF00"/>
-                            </a:highlight>
-                            <a:latin typeface="Cambria Math" panose="02040503050406030204" pitchFamily="18" charset="0"/>
-                            <a:ea typeface="Times New Roman" panose="02020603050405020304" pitchFamily="18" charset="0"/>
-                            <a:cs typeface="David" panose="020E0502060401010101" pitchFamily="34" charset="-79"/>
-                          </a:rPr>
-                          <m:t>𝟏</m:t>
-                        </m:r>
-                      </m:num>
-                      <m:den>
-                        <m:sSubSup>
-                          <m:sSubSupPr>
-                            <m:ctrlPr>
-                              <a:rPr lang="en-US" sz="2000" b="1" i="1">
-                                <a:effectLst/>
-                                <a:highlight>
-                                  <a:srgbClr val="FFFF00"/>
-                                </a:highlight>
-                                <a:latin typeface="Cambria Math" panose="02040503050406030204" pitchFamily="18" charset="0"/>
-                                <a:ea typeface="Times New Roman" panose="02020603050405020304" pitchFamily="18" charset="0"/>
-                                <a:cs typeface="David" panose="020E0502060401010101" pitchFamily="34" charset="-79"/>
-                              </a:rPr>
-                            </m:ctrlPr>
-                          </m:sSubSupPr>
-                          <m:e>
-                            <m:r>
-                              <a:rPr lang="en-US" sz="2000" b="1" i="1">
-                                <a:effectLst/>
-                                <a:highlight>
-                                  <a:srgbClr val="FFFF00"/>
-                                </a:highlight>
-                                <a:latin typeface="Cambria Math" panose="02040503050406030204" pitchFamily="18" charset="0"/>
-                                <a:ea typeface="Times New Roman" panose="02020603050405020304" pitchFamily="18" charset="0"/>
-                                <a:cs typeface="David" panose="020E0502060401010101" pitchFamily="34" charset="-79"/>
-                              </a:rPr>
-                              <m:t>𝝈</m:t>
-                            </m:r>
-                          </m:e>
-                          <m:sub>
-                            <m:r>
-                              <a:rPr lang="en-US" sz="2000" b="1" i="1">
-                                <a:effectLst/>
-                                <a:highlight>
-                                  <a:srgbClr val="FFFF00"/>
-                                </a:highlight>
-                                <a:latin typeface="Cambria Math" panose="02040503050406030204" pitchFamily="18" charset="0"/>
-                                <a:ea typeface="Times New Roman" panose="02020603050405020304" pitchFamily="18" charset="0"/>
-                                <a:cs typeface="David" panose="020E0502060401010101" pitchFamily="34" charset="-79"/>
-                              </a:rPr>
-                              <m:t>𝒏</m:t>
-                            </m:r>
-                          </m:sub>
-                          <m:sup>
-                            <m:r>
-                              <a:rPr lang="en-US" sz="2000" b="1" i="1">
-                                <a:effectLst/>
-                                <a:highlight>
-                                  <a:srgbClr val="FFFF00"/>
-                                </a:highlight>
-                                <a:latin typeface="Cambria Math" panose="02040503050406030204" pitchFamily="18" charset="0"/>
-                                <a:ea typeface="Times New Roman" panose="02020603050405020304" pitchFamily="18" charset="0"/>
-                                <a:cs typeface="David" panose="020E0502060401010101" pitchFamily="34" charset="-79"/>
-                              </a:rPr>
-                              <m:t>𝟐</m:t>
-                            </m:r>
-                          </m:sup>
-                        </m:sSubSup>
-                      </m:den>
-                    </m:f>
-                    <m:sSubSup>
-                      <m:sSubSupPr>
-                        <m:ctrlPr>
-                          <a:rPr lang="en-US" sz="2000" b="1" i="1">
-                            <a:effectLst/>
-                            <a:highlight>
-                              <a:srgbClr val="FFFF00"/>
-                            </a:highlight>
-                            <a:latin typeface="Cambria Math" panose="02040503050406030204" pitchFamily="18" charset="0"/>
-                            <a:ea typeface="Times New Roman" panose="02020603050405020304" pitchFamily="18" charset="0"/>
-                            <a:cs typeface="David" panose="020E0502060401010101" pitchFamily="34" charset="-79"/>
-                          </a:rPr>
-                        </m:ctrlPr>
-                      </m:sSubSupPr>
-                      <m:e>
-                        <m:d>
-                          <m:dPr>
-                            <m:begChr m:val="‖"/>
-                            <m:endChr m:val="‖"/>
-                            <m:ctrlPr>
-                              <a:rPr lang="en-US" sz="2000" b="1" i="1">
-                                <a:effectLst/>
-                                <a:highlight>
-                                  <a:srgbClr val="FFFF00"/>
-                                </a:highlight>
-                                <a:latin typeface="Cambria Math" panose="02040503050406030204" pitchFamily="18" charset="0"/>
-                                <a:ea typeface="Times New Roman" panose="02020603050405020304" pitchFamily="18" charset="0"/>
-                                <a:cs typeface="David" panose="020E0502060401010101" pitchFamily="34" charset="-79"/>
-                              </a:rPr>
-                            </m:ctrlPr>
-                          </m:dPr>
-                          <m:e>
-                            <m:r>
-                              <a:rPr lang="en-US" sz="2000" b="1" i="1" smtClean="0">
-                                <a:effectLst/>
-                                <a:highlight>
-                                  <a:srgbClr val="FFFF00"/>
-                                </a:highlight>
-                                <a:latin typeface="Cambria Math" panose="02040503050406030204" pitchFamily="18" charset="0"/>
-                                <a:ea typeface="Times New Roman" panose="02020603050405020304" pitchFamily="18" charset="0"/>
-                                <a:cs typeface="David" panose="020E0502060401010101" pitchFamily="34" charset="-79"/>
-                              </a:rPr>
-                              <m:t>𝒀</m:t>
-                            </m:r>
-                            <m:r>
-                              <a:rPr lang="en-US" sz="2000" b="1" i="1">
-                                <a:effectLst/>
-                                <a:highlight>
-                                  <a:srgbClr val="FFFF00"/>
-                                </a:highlight>
-                                <a:latin typeface="Cambria Math" panose="02040503050406030204" pitchFamily="18" charset="0"/>
-                                <a:ea typeface="Times New Roman" panose="02020603050405020304" pitchFamily="18" charset="0"/>
-                                <a:cs typeface="David" panose="020E0502060401010101" pitchFamily="34" charset="-79"/>
-                              </a:rPr>
-                              <m:t>−</m:t>
-                            </m:r>
-                            <m:r>
-                              <a:rPr lang="en-US" sz="2000" b="1" i="1" smtClean="0">
-                                <a:effectLst/>
-                                <a:highlight>
-                                  <a:srgbClr val="FFFF00"/>
-                                </a:highlight>
-                                <a:latin typeface="Cambria Math" panose="02040503050406030204" pitchFamily="18" charset="0"/>
-                                <a:ea typeface="Times New Roman" panose="02020603050405020304" pitchFamily="18" charset="0"/>
-                                <a:cs typeface="David" panose="020E0502060401010101" pitchFamily="34" charset="-79"/>
-                              </a:rPr>
-                              <m:t>𝑿</m:t>
-                            </m:r>
-                          </m:e>
-                        </m:d>
-                      </m:e>
-                      <m:sub>
-                        <m:r>
-                          <a:rPr lang="en-US" sz="2000" b="1" i="1">
-                            <a:effectLst/>
-                            <a:highlight>
-                              <a:srgbClr val="FFFF00"/>
-                            </a:highlight>
-                            <a:latin typeface="Cambria Math" panose="02040503050406030204" pitchFamily="18" charset="0"/>
-                            <a:ea typeface="Times New Roman" panose="02020603050405020304" pitchFamily="18" charset="0"/>
-                            <a:cs typeface="David" panose="020E0502060401010101" pitchFamily="34" charset="-79"/>
-                          </a:rPr>
-                          <m:t>𝑭</m:t>
-                        </m:r>
-                      </m:sub>
-                      <m:sup>
-                        <m:r>
-                          <a:rPr lang="en-US" sz="2000" b="1" i="1">
-                            <a:effectLst/>
-                            <a:highlight>
-                              <a:srgbClr val="FFFF00"/>
-                            </a:highlight>
-                            <a:latin typeface="Cambria Math" panose="02040503050406030204" pitchFamily="18" charset="0"/>
-                            <a:ea typeface="Times New Roman" panose="02020603050405020304" pitchFamily="18" charset="0"/>
-                            <a:cs typeface="David" panose="020E0502060401010101" pitchFamily="34" charset="-79"/>
-                          </a:rPr>
-                          <m:t>𝟐</m:t>
-                        </m:r>
-                      </m:sup>
-                    </m:sSubSup>
-                    <m:r>
-                      <a:rPr lang="en-US" sz="2000" b="1" i="1">
-                        <a:effectLst/>
-                        <a:highlight>
-                          <a:srgbClr val="FFFF00"/>
-                        </a:highlight>
-                        <a:latin typeface="Cambria Math" panose="02040503050406030204" pitchFamily="18" charset="0"/>
-                        <a:ea typeface="Times New Roman" panose="02020603050405020304" pitchFamily="18" charset="0"/>
-                        <a:cs typeface="David" panose="020E0502060401010101" pitchFamily="34" charset="-79"/>
-                      </a:rPr>
-                      <m:t>+</m:t>
-                    </m:r>
-                    <m:sSub>
-                      <m:sSubPr>
-                        <m:ctrlPr>
-                          <a:rPr lang="en-US" sz="2000" b="1" i="1">
-                            <a:effectLst/>
-                            <a:highlight>
-                              <a:srgbClr val="FFFF00"/>
-                            </a:highlight>
-                            <a:latin typeface="Cambria Math" panose="02040503050406030204" pitchFamily="18" charset="0"/>
-                            <a:ea typeface="Times New Roman" panose="02020603050405020304" pitchFamily="18" charset="0"/>
-                            <a:cs typeface="David" panose="020E0502060401010101" pitchFamily="34" charset="-79"/>
-                          </a:rPr>
-                        </m:ctrlPr>
-                      </m:sSubPr>
-                      <m:e>
-                        <m:d>
-                          <m:dPr>
-                            <m:begChr m:val="‖"/>
-                            <m:endChr m:val="‖"/>
-                            <m:ctrlPr>
-                              <a:rPr lang="en-US" sz="2000" b="1" i="1">
-                                <a:effectLst/>
-                                <a:highlight>
-                                  <a:srgbClr val="FFFF00"/>
-                                </a:highlight>
-                                <a:latin typeface="Cambria Math" panose="02040503050406030204" pitchFamily="18" charset="0"/>
-                                <a:ea typeface="Times New Roman" panose="02020603050405020304" pitchFamily="18" charset="0"/>
-                                <a:cs typeface="David" panose="020E0502060401010101" pitchFamily="34" charset="-79"/>
-                              </a:rPr>
-                            </m:ctrlPr>
-                          </m:dPr>
-                          <m:e>
-                            <m:r>
-                              <a:rPr lang="en-US" sz="2000" b="1" i="1" smtClean="0">
-                                <a:effectLst/>
-                                <a:highlight>
-                                  <a:srgbClr val="FFFF00"/>
-                                </a:highlight>
-                                <a:latin typeface="Cambria Math" panose="02040503050406030204" pitchFamily="18" charset="0"/>
-                                <a:ea typeface="Times New Roman" panose="02020603050405020304" pitchFamily="18" charset="0"/>
-                                <a:cs typeface="David" panose="020E0502060401010101" pitchFamily="34" charset="-79"/>
-                              </a:rPr>
-                              <m:t>𝑿</m:t>
-                            </m:r>
-                          </m:e>
-                        </m:d>
-                      </m:e>
-                      <m:sub>
-                        <m:r>
-                          <a:rPr lang="en-US" sz="2000" b="1" i="1">
-                            <a:effectLst/>
-                            <a:highlight>
-                              <a:srgbClr val="FFFF00"/>
-                            </a:highlight>
-                            <a:latin typeface="Cambria Math" panose="02040503050406030204" pitchFamily="18" charset="0"/>
-                            <a:ea typeface="Times New Roman" panose="02020603050405020304" pitchFamily="18" charset="0"/>
-                            <a:cs typeface="David" panose="020E0502060401010101" pitchFamily="34" charset="-79"/>
-                          </a:rPr>
-                          <m:t>𝒘</m:t>
-                        </m:r>
-                        <m:r>
-                          <a:rPr lang="en-US" sz="2000" b="1" i="1">
-                            <a:effectLst/>
-                            <a:highlight>
-                              <a:srgbClr val="FFFF00"/>
-                            </a:highlight>
-                            <a:latin typeface="Cambria Math" panose="02040503050406030204" pitchFamily="18" charset="0"/>
-                            <a:ea typeface="Times New Roman" panose="02020603050405020304" pitchFamily="18" charset="0"/>
-                            <a:cs typeface="David" panose="020E0502060401010101" pitchFamily="34" charset="-79"/>
-                          </a:rPr>
-                          <m:t>,∗</m:t>
-                        </m:r>
-                      </m:sub>
-                    </m:sSub>
-                  </m:oMath>
+                  <m:oMathPara xmlns:m="http://schemas.openxmlformats.org/officeDocument/2006/math">
+                    <m:oMathParaPr>
+                      <m:jc m:val="centerGroup"/>
+                    </m:oMathParaPr>
+                    <m:oMath xmlns:m="http://schemas.openxmlformats.org/officeDocument/2006/math">
+                      <m:sSub>
+                        <m:sSubPr>
+                          <m:ctrlPr>
+                            <a:rPr lang="en-US" i="1" smtClean="0">
+                              <a:solidFill>
+                                <a:srgbClr val="836967"/>
+                              </a:solidFill>
+                              <a:latin typeface="Cambria Math" panose="02040503050406030204" pitchFamily="18" charset="0"/>
+                            </a:rPr>
+                          </m:ctrlPr>
+                        </m:sSubPr>
+                        <m:e>
+                          <m:r>
+                            <a:rPr lang="en-US" i="1">
+                              <a:latin typeface="Cambria Math" panose="02040503050406030204" pitchFamily="18" charset="0"/>
+                            </a:rPr>
+                            <m:t>𝑌</m:t>
+                          </m:r>
+                        </m:e>
+                        <m:sub>
+                          <m:r>
+                            <a:rPr lang="en-US" i="1">
+                              <a:latin typeface="Cambria Math" panose="02040503050406030204" pitchFamily="18" charset="0"/>
+                            </a:rPr>
+                            <m:t>𝑖</m:t>
+                          </m:r>
+                        </m:sub>
+                      </m:sSub>
+                      <m:r>
+                        <a:rPr lang="en-US" i="0">
+                          <a:latin typeface="Cambria Math" panose="02040503050406030204" pitchFamily="18" charset="0"/>
+                        </a:rPr>
+                        <m:t>⋯</m:t>
+                      </m:r>
+                      <m:sSub>
+                        <m:sSubPr>
+                          <m:ctrlPr>
+                            <a:rPr lang="en-US" i="1">
+                              <a:solidFill>
+                                <a:srgbClr val="836967"/>
+                              </a:solidFill>
+                              <a:latin typeface="Cambria Math" panose="02040503050406030204" pitchFamily="18" charset="0"/>
+                            </a:rPr>
+                          </m:ctrlPr>
+                        </m:sSubPr>
+                        <m:e>
+                          <m:r>
+                            <a:rPr lang="en-US" i="1">
+                              <a:latin typeface="Cambria Math" panose="02040503050406030204" pitchFamily="18" charset="0"/>
+                            </a:rPr>
+                            <m:t>𝑌</m:t>
+                          </m:r>
+                        </m:e>
+                        <m:sub>
+                          <m:r>
+                            <a:rPr lang="en-US" i="1">
+                              <a:latin typeface="Cambria Math" panose="02040503050406030204" pitchFamily="18" charset="0"/>
+                            </a:rPr>
+                            <m:t>𝑗</m:t>
+                          </m:r>
+                        </m:sub>
+                      </m:sSub>
+                    </m:oMath>
+                  </m:oMathPara>
                 </a14:m>
-                <a:endParaRPr lang="en-US" dirty="0">
-                  <a:highlight>
-                    <a:srgbClr val="FFFF00"/>
-                  </a:highlight>
-                </a:endParaRPr>
-              </a:p>
-              <a:p>
-                <a:pPr marL="0" indent="0" algn="l" rtl="0">
-                  <a:buNone/>
-                </a:pPr>
                 <a:endParaRPr lang="en-US" dirty="0"/>
               </a:p>
             </p:txBody>
           </p:sp>
         </mc:Choice>
-        <mc:Fallback xmlns="">
+        <mc:Fallback>
           <p:sp>
             <p:nvSpPr>
-              <p:cNvPr id="3" name="מציין מיקום תוכן 2">
+              <p:cNvPr id="22" name="תיבת טקסט 21">
                 <a:extLst>
                   <a:ext uri="{FF2B5EF4-FFF2-40B4-BE49-F238E27FC236}">
-                    <a16:creationId xmlns:a16="http://schemas.microsoft.com/office/drawing/2014/main" id="{C36F00ED-786D-49AC-B981-CA0615B0391B}"/>
+                    <a16:creationId xmlns:a16="http://schemas.microsoft.com/office/drawing/2014/main" id="{5C37BC17-A1E2-483C-A1AE-76FA855AD154}"/>
                   </a:ext>
                 </a:extLst>
               </p:cNvPr>
-              <p:cNvSpPr>
-                <a:spLocks noGrp="1" noRot="1" noChangeAspect="1" noMove="1" noResize="1" noEditPoints="1" noAdjustHandles="1" noChangeArrowheads="1" noChangeShapeType="1" noTextEdit="1"/>
+              <p:cNvSpPr txBox="1">
+                <a:spLocks noRot="1" noChangeAspect="1" noMove="1" noResize="1" noEditPoints="1" noAdjustHandles="1" noChangeArrowheads="1" noChangeShapeType="1" noTextEdit="1"/>
               </p:cNvSpPr>
-              <p:nvPr>
-                <p:ph idx="1"/>
-              </p:nvPr>
+              <p:nvPr/>
             </p:nvSpPr>
             <p:spPr>
+              <a:xfrm>
+                <a:off x="7861980" y="3524619"/>
+                <a:ext cx="1083581" cy="391646"/>
+              </a:xfrm>
+              <a:prstGeom prst="rect">
+                <a:avLst/>
+              </a:prstGeom>
               <a:blipFill>
-                <a:blip r:embed="rId2"/>
+                <a:blip r:embed="rId4"/>
                 <a:stretch>
-                  <a:fillRect l="-1515" t="-1667"/>
+                  <a:fillRect b="-9375"/>
                 </a:stretch>
               </a:blipFill>
             </p:spPr>
@@ -22649,6 +22498,1431 @@
           </p:sp>
         </mc:Fallback>
       </mc:AlternateContent>
+      <mc:AlternateContent xmlns:mc="http://schemas.openxmlformats.org/markup-compatibility/2006">
+        <mc:Choice xmlns:a14="http://schemas.microsoft.com/office/drawing/2010/main" Requires="a14">
+          <p:sp>
+            <p:nvSpPr>
+              <p:cNvPr id="24" name="תיבת טקסט 23">
+                <a:extLst>
+                  <a:ext uri="{FF2B5EF4-FFF2-40B4-BE49-F238E27FC236}">
+                    <a16:creationId xmlns:a16="http://schemas.microsoft.com/office/drawing/2014/main" id="{B2185C7D-1BA2-4CFF-AA2F-C03F0CBDF83C}"/>
+                  </a:ext>
+                </a:extLst>
+              </p:cNvPr>
+              <p:cNvSpPr txBox="1"/>
+              <p:nvPr/>
+            </p:nvSpPr>
+            <p:spPr>
+              <a:xfrm>
+                <a:off x="10446654" y="240996"/>
+                <a:ext cx="364654" cy="391646"/>
+              </a:xfrm>
+              <a:prstGeom prst="rect">
+                <a:avLst/>
+              </a:prstGeom>
+              <a:noFill/>
+            </p:spPr>
+            <p:txBody>
+              <a:bodyPr wrap="square">
+                <a:spAutoFit/>
+              </a:bodyPr>
+              <a:lstStyle/>
+              <a:p>
+                <a:pPr/>
+                <a14:m>
+                  <m:oMathPara xmlns:m="http://schemas.openxmlformats.org/officeDocument/2006/math">
+                    <m:oMathParaPr>
+                      <m:jc m:val="centerGroup"/>
+                    </m:oMathParaPr>
+                    <m:oMath xmlns:m="http://schemas.openxmlformats.org/officeDocument/2006/math">
+                      <m:sSub>
+                        <m:sSubPr>
+                          <m:ctrlPr>
+                            <a:rPr lang="en-US" b="0" i="1" smtClean="0">
+                              <a:latin typeface="Cambria Math" panose="02040503050406030204" pitchFamily="18" charset="0"/>
+                            </a:rPr>
+                          </m:ctrlPr>
+                        </m:sSubPr>
+                        <m:e>
+                          <m:r>
+                            <a:rPr lang="en-US" i="1" smtClean="0">
+                              <a:latin typeface="Cambria Math" panose="02040503050406030204" pitchFamily="18" charset="0"/>
+                            </a:rPr>
+                            <m:t>𝑦</m:t>
+                          </m:r>
+                        </m:e>
+                        <m:sub>
+                          <m:r>
+                            <a:rPr lang="en-US" b="0" i="1" smtClean="0">
+                              <a:latin typeface="Cambria Math" panose="02040503050406030204" pitchFamily="18" charset="0"/>
+                            </a:rPr>
+                            <m:t>𝑗</m:t>
+                          </m:r>
+                        </m:sub>
+                      </m:sSub>
+                    </m:oMath>
+                  </m:oMathPara>
+                </a14:m>
+                <a:endParaRPr lang="en-US" dirty="0"/>
+              </a:p>
+            </p:txBody>
+          </p:sp>
+        </mc:Choice>
+        <mc:Fallback>
+          <p:sp>
+            <p:nvSpPr>
+              <p:cNvPr id="24" name="תיבת טקסט 23">
+                <a:extLst>
+                  <a:ext uri="{FF2B5EF4-FFF2-40B4-BE49-F238E27FC236}">
+                    <a16:creationId xmlns:a16="http://schemas.microsoft.com/office/drawing/2014/main" id="{B2185C7D-1BA2-4CFF-AA2F-C03F0CBDF83C}"/>
+                  </a:ext>
+                </a:extLst>
+              </p:cNvPr>
+              <p:cNvSpPr txBox="1">
+                <a:spLocks noRot="1" noChangeAspect="1" noMove="1" noResize="1" noEditPoints="1" noAdjustHandles="1" noChangeArrowheads="1" noChangeShapeType="1" noTextEdit="1"/>
+              </p:cNvSpPr>
+              <p:nvPr/>
+            </p:nvSpPr>
+            <p:spPr>
+              <a:xfrm>
+                <a:off x="10446654" y="240996"/>
+                <a:ext cx="364654" cy="391646"/>
+              </a:xfrm>
+              <a:prstGeom prst="rect">
+                <a:avLst/>
+              </a:prstGeom>
+              <a:blipFill>
+                <a:blip r:embed="rId5"/>
+                <a:stretch>
+                  <a:fillRect b="-7813"/>
+                </a:stretch>
+              </a:blipFill>
+            </p:spPr>
+            <p:txBody>
+              <a:bodyPr/>
+              <a:lstStyle/>
+              <a:p>
+                <a:r>
+                  <a:rPr lang="en-US">
+                    <a:noFill/>
+                  </a:rPr>
+                  <a:t> </a:t>
+                </a:r>
+              </a:p>
+            </p:txBody>
+          </p:sp>
+        </mc:Fallback>
+      </mc:AlternateContent>
+      <mc:AlternateContent xmlns:mc="http://schemas.openxmlformats.org/markup-compatibility/2006">
+        <mc:Choice xmlns:a14="http://schemas.microsoft.com/office/drawing/2010/main" Requires="a14">
+          <p:sp>
+            <p:nvSpPr>
+              <p:cNvPr id="43" name="תיבת טקסט 42">
+                <a:extLst>
+                  <a:ext uri="{FF2B5EF4-FFF2-40B4-BE49-F238E27FC236}">
+                    <a16:creationId xmlns:a16="http://schemas.microsoft.com/office/drawing/2014/main" id="{1A8571DE-3B4F-4CF4-8743-7E1E2BF79948}"/>
+                  </a:ext>
+                </a:extLst>
+              </p:cNvPr>
+              <p:cNvSpPr txBox="1"/>
+              <p:nvPr/>
+            </p:nvSpPr>
+            <p:spPr>
+              <a:xfrm>
+                <a:off x="5131215" y="5750709"/>
+                <a:ext cx="364654" cy="369332"/>
+              </a:xfrm>
+              <a:prstGeom prst="rect">
+                <a:avLst/>
+              </a:prstGeom>
+              <a:noFill/>
+            </p:spPr>
+            <p:txBody>
+              <a:bodyPr wrap="square">
+                <a:spAutoFit/>
+              </a:bodyPr>
+              <a:lstStyle/>
+              <a:p>
+                <a:pPr/>
+                <a14:m>
+                  <m:oMathPara xmlns:m="http://schemas.openxmlformats.org/officeDocument/2006/math">
+                    <m:oMathParaPr>
+                      <m:jc m:val="centerGroup"/>
+                    </m:oMathParaPr>
+                    <m:oMath xmlns:m="http://schemas.openxmlformats.org/officeDocument/2006/math">
+                      <m:acc>
+                        <m:accPr>
+                          <m:chr m:val="̂"/>
+                          <m:ctrlPr>
+                            <a:rPr lang="en-US" b="0" i="1" smtClean="0">
+                              <a:latin typeface="Cambria Math" panose="02040503050406030204" pitchFamily="18" charset="0"/>
+                            </a:rPr>
+                          </m:ctrlPr>
+                        </m:accPr>
+                        <m:e>
+                          <m:r>
+                            <a:rPr lang="en-US" b="0" i="1" smtClean="0">
+                              <a:latin typeface="Cambria Math" panose="02040503050406030204" pitchFamily="18" charset="0"/>
+                            </a:rPr>
+                            <m:t>𝑥</m:t>
+                          </m:r>
+                        </m:e>
+                      </m:acc>
+                    </m:oMath>
+                  </m:oMathPara>
+                </a14:m>
+                <a:endParaRPr lang="en-US" dirty="0"/>
+              </a:p>
+            </p:txBody>
+          </p:sp>
+        </mc:Choice>
+        <mc:Fallback>
+          <p:sp>
+            <p:nvSpPr>
+              <p:cNvPr id="43" name="תיבת טקסט 42">
+                <a:extLst>
+                  <a:ext uri="{FF2B5EF4-FFF2-40B4-BE49-F238E27FC236}">
+                    <a16:creationId xmlns:a16="http://schemas.microsoft.com/office/drawing/2014/main" id="{1A8571DE-3B4F-4CF4-8743-7E1E2BF79948}"/>
+                  </a:ext>
+                </a:extLst>
+              </p:cNvPr>
+              <p:cNvSpPr txBox="1">
+                <a:spLocks noRot="1" noChangeAspect="1" noMove="1" noResize="1" noEditPoints="1" noAdjustHandles="1" noChangeArrowheads="1" noChangeShapeType="1" noTextEdit="1"/>
+              </p:cNvSpPr>
+              <p:nvPr/>
+            </p:nvSpPr>
+            <p:spPr>
+              <a:xfrm>
+                <a:off x="5131215" y="5750709"/>
+                <a:ext cx="364654" cy="369332"/>
+              </a:xfrm>
+              <a:prstGeom prst="rect">
+                <a:avLst/>
+              </a:prstGeom>
+              <a:blipFill>
+                <a:blip r:embed="rId6"/>
+                <a:stretch>
+                  <a:fillRect t="-6557" r="-13333"/>
+                </a:stretch>
+              </a:blipFill>
+            </p:spPr>
+            <p:txBody>
+              <a:bodyPr/>
+              <a:lstStyle/>
+              <a:p>
+                <a:r>
+                  <a:rPr lang="en-US">
+                    <a:noFill/>
+                  </a:rPr>
+                  <a:t> </a:t>
+                </a:r>
+              </a:p>
+            </p:txBody>
+          </p:sp>
+        </mc:Fallback>
+      </mc:AlternateContent>
+      <p:cxnSp>
+        <p:nvCxnSpPr>
+          <p:cNvPr id="28" name="מחבר חץ ישר 27">
+            <a:extLst>
+              <a:ext uri="{FF2B5EF4-FFF2-40B4-BE49-F238E27FC236}">
+                <a16:creationId xmlns:a16="http://schemas.microsoft.com/office/drawing/2014/main" id="{FCEFFB68-D9C2-45E9-AEEF-34F37AE15951}"/>
+              </a:ext>
+            </a:extLst>
+          </p:cNvPr>
+          <p:cNvCxnSpPr>
+            <a:cxnSpLocks/>
+            <a:stCxn id="22" idx="0"/>
+          </p:cNvCxnSpPr>
+          <p:nvPr/>
+        </p:nvCxnSpPr>
+        <p:spPr>
+          <a:xfrm flipH="1" flipV="1">
+            <a:off x="8287959" y="2173013"/>
+            <a:ext cx="115812" cy="1351606"/>
+          </a:xfrm>
+          <a:prstGeom prst="straightConnector1">
+            <a:avLst/>
+          </a:prstGeom>
+          <a:ln w="28575">
+            <a:solidFill>
+              <a:schemeClr val="tx1">
+                <a:lumMod val="95000"/>
+                <a:lumOff val="5000"/>
+              </a:schemeClr>
+            </a:solidFill>
+            <a:tailEnd type="triangle"/>
+          </a:ln>
+        </p:spPr>
+        <p:style>
+          <a:lnRef idx="1">
+            <a:schemeClr val="dk1"/>
+          </a:lnRef>
+          <a:fillRef idx="0">
+            <a:schemeClr val="dk1"/>
+          </a:fillRef>
+          <a:effectRef idx="0">
+            <a:schemeClr val="dk1"/>
+          </a:effectRef>
+          <a:fontRef idx="minor">
+            <a:schemeClr val="tx1"/>
+          </a:fontRef>
+        </p:style>
+      </p:cxnSp>
+      <mc:AlternateContent xmlns:mc="http://schemas.openxmlformats.org/markup-compatibility/2006">
+        <mc:Choice xmlns:a14="http://schemas.microsoft.com/office/drawing/2010/main" Requires="a14">
+          <p:sp>
+            <p:nvSpPr>
+              <p:cNvPr id="32" name="תיבת טקסט 31">
+                <a:extLst>
+                  <a:ext uri="{FF2B5EF4-FFF2-40B4-BE49-F238E27FC236}">
+                    <a16:creationId xmlns:a16="http://schemas.microsoft.com/office/drawing/2014/main" id="{320B62EC-AD69-40B8-A365-6784C8506546}"/>
+                  </a:ext>
+                </a:extLst>
+              </p:cNvPr>
+              <p:cNvSpPr txBox="1"/>
+              <p:nvPr/>
+            </p:nvSpPr>
+            <p:spPr>
+              <a:xfrm>
+                <a:off x="6902537" y="214831"/>
+                <a:ext cx="489857" cy="387927"/>
+              </a:xfrm>
+              <a:prstGeom prst="rect">
+                <a:avLst/>
+              </a:prstGeom>
+              <a:noFill/>
+            </p:spPr>
+            <p:txBody>
+              <a:bodyPr wrap="square">
+                <a:spAutoFit/>
+              </a:bodyPr>
+              <a:lstStyle/>
+              <a:p>
+                <a:pPr/>
+                <a14:m>
+                  <m:oMathPara xmlns:m="http://schemas.openxmlformats.org/officeDocument/2006/math">
+                    <m:oMathParaPr>
+                      <m:jc m:val="centerGroup"/>
+                    </m:oMathParaPr>
+                    <m:oMath xmlns:m="http://schemas.openxmlformats.org/officeDocument/2006/math">
+                      <m:sSup>
+                        <m:sSupPr>
+                          <m:ctrlPr>
+                            <a:rPr lang="en-US" b="1" i="1" smtClean="0">
+                              <a:solidFill>
+                                <a:srgbClr val="836967"/>
+                              </a:solidFill>
+                              <a:latin typeface="Cambria Math" panose="02040503050406030204" pitchFamily="18" charset="0"/>
+                            </a:rPr>
+                          </m:ctrlPr>
+                        </m:sSupPr>
+                        <m:e>
+                          <m:r>
+                            <a:rPr lang="en-US" b="1" i="1">
+                              <a:latin typeface="Cambria Math" panose="02040503050406030204" pitchFamily="18" charset="0"/>
+                            </a:rPr>
+                            <m:t>𝒚</m:t>
+                          </m:r>
+                        </m:e>
+                        <m:sup>
+                          <m:d>
+                            <m:dPr>
+                              <m:ctrlPr>
+                                <a:rPr lang="en-US" b="1" i="1">
+                                  <a:latin typeface="Cambria Math" panose="02040503050406030204" pitchFamily="18" charset="0"/>
+                                </a:rPr>
+                              </m:ctrlPr>
+                            </m:dPr>
+                            <m:e>
+                              <m:r>
+                                <a:rPr lang="en-US" b="1" i="1">
+                                  <a:latin typeface="Cambria Math" panose="02040503050406030204" pitchFamily="18" charset="0"/>
+                                </a:rPr>
+                                <m:t>𝒌</m:t>
+                              </m:r>
+                            </m:e>
+                          </m:d>
+                        </m:sup>
+                      </m:sSup>
+                    </m:oMath>
+                  </m:oMathPara>
+                </a14:m>
+                <a:endParaRPr lang="en-US" b="1" dirty="0"/>
+              </a:p>
+            </p:txBody>
+          </p:sp>
+        </mc:Choice>
+        <mc:Fallback>
+          <p:sp>
+            <p:nvSpPr>
+              <p:cNvPr id="32" name="תיבת טקסט 31">
+                <a:extLst>
+                  <a:ext uri="{FF2B5EF4-FFF2-40B4-BE49-F238E27FC236}">
+                    <a16:creationId xmlns:a16="http://schemas.microsoft.com/office/drawing/2014/main" id="{320B62EC-AD69-40B8-A365-6784C8506546}"/>
+                  </a:ext>
+                </a:extLst>
+              </p:cNvPr>
+              <p:cNvSpPr txBox="1">
+                <a:spLocks noRot="1" noChangeAspect="1" noMove="1" noResize="1" noEditPoints="1" noAdjustHandles="1" noChangeArrowheads="1" noChangeShapeType="1" noTextEdit="1"/>
+              </p:cNvSpPr>
+              <p:nvPr/>
+            </p:nvSpPr>
+            <p:spPr>
+              <a:xfrm>
+                <a:off x="6902537" y="214831"/>
+                <a:ext cx="489857" cy="387927"/>
+              </a:xfrm>
+              <a:prstGeom prst="rect">
+                <a:avLst/>
+              </a:prstGeom>
+              <a:blipFill>
+                <a:blip r:embed="rId7"/>
+                <a:stretch>
+                  <a:fillRect b="-6250"/>
+                </a:stretch>
+              </a:blipFill>
+            </p:spPr>
+            <p:txBody>
+              <a:bodyPr/>
+              <a:lstStyle/>
+              <a:p>
+                <a:r>
+                  <a:rPr lang="en-US">
+                    <a:noFill/>
+                  </a:rPr>
+                  <a:t> </a:t>
+                </a:r>
+              </a:p>
+            </p:txBody>
+          </p:sp>
+        </mc:Fallback>
+      </mc:AlternateContent>
+      <p:sp>
+        <p:nvSpPr>
+          <p:cNvPr id="55" name="תיבת טקסט 54">
+            <a:extLst>
+              <a:ext uri="{FF2B5EF4-FFF2-40B4-BE49-F238E27FC236}">
+                <a16:creationId xmlns:a16="http://schemas.microsoft.com/office/drawing/2014/main" id="{09BB56A8-5786-4F67-A948-BC4BA04FAE04}"/>
+              </a:ext>
+            </a:extLst>
+          </p:cNvPr>
+          <p:cNvSpPr txBox="1"/>
+          <p:nvPr/>
+        </p:nvSpPr>
+        <p:spPr>
+          <a:xfrm>
+            <a:off x="9537708" y="4200748"/>
+            <a:ext cx="720274" cy="369332"/>
+          </a:xfrm>
+          <a:prstGeom prst="rect">
+            <a:avLst/>
+          </a:prstGeom>
+          <a:noFill/>
+        </p:spPr>
+        <p:txBody>
+          <a:bodyPr wrap="square" rtlCol="0">
+            <a:spAutoFit/>
+          </a:bodyPr>
+          <a:lstStyle/>
+          <a:p>
+            <a:pPr algn="ctr"/>
+            <a:r>
+              <a:rPr lang="en-US" dirty="0"/>
+              <a:t>SVD</a:t>
+            </a:r>
+          </a:p>
+        </p:txBody>
+      </p:sp>
+      <mc:AlternateContent xmlns:mc="http://schemas.openxmlformats.org/markup-compatibility/2006">
+        <mc:Choice xmlns:a14="http://schemas.microsoft.com/office/drawing/2010/main" Requires="a14">
+          <p:sp>
+            <p:nvSpPr>
+              <p:cNvPr id="59" name="תיבת טקסט 58">
+                <a:extLst>
+                  <a:ext uri="{FF2B5EF4-FFF2-40B4-BE49-F238E27FC236}">
+                    <a16:creationId xmlns:a16="http://schemas.microsoft.com/office/drawing/2014/main" id="{855D62F7-25A6-4E74-B237-2EA034F41933}"/>
+                  </a:ext>
+                </a:extLst>
+              </p:cNvPr>
+              <p:cNvSpPr txBox="1"/>
+              <p:nvPr/>
+            </p:nvSpPr>
+            <p:spPr>
+              <a:xfrm>
+                <a:off x="5495869" y="4043056"/>
+                <a:ext cx="2783935" cy="695127"/>
+              </a:xfrm>
+              <a:prstGeom prst="rect">
+                <a:avLst/>
+              </a:prstGeom>
+              <a:noFill/>
+            </p:spPr>
+            <p:txBody>
+              <a:bodyPr wrap="square">
+                <a:spAutoFit/>
+              </a:bodyPr>
+              <a:lstStyle/>
+              <a:p>
+                <a:pPr/>
+                <a14:m>
+                  <m:oMathPara xmlns:m="http://schemas.openxmlformats.org/officeDocument/2006/math">
+                    <m:oMathParaPr>
+                      <m:jc m:val="centerGroup"/>
+                    </m:oMathParaPr>
+                    <m:oMath xmlns:m="http://schemas.openxmlformats.org/officeDocument/2006/math">
+                      <m:sSub>
+                        <m:sSubPr>
+                          <m:ctrlPr>
+                            <a:rPr lang="en-US" sz="1200" i="1" smtClean="0">
+                              <a:solidFill>
+                                <a:srgbClr val="836967"/>
+                              </a:solidFill>
+                              <a:latin typeface="Cambria Math" panose="02040503050406030204" pitchFamily="18" charset="0"/>
+                            </a:rPr>
+                          </m:ctrlPr>
+                        </m:sSubPr>
+                        <m:e>
+                          <m:r>
+                            <a:rPr lang="en-US" sz="1200" i="1">
+                              <a:latin typeface="Cambria Math" panose="02040503050406030204" pitchFamily="18" charset="0"/>
+                            </a:rPr>
+                            <m:t>𝑤</m:t>
+                          </m:r>
+                        </m:e>
+                        <m:sub>
+                          <m:r>
+                            <a:rPr lang="en-US" sz="1200" i="1">
+                              <a:latin typeface="Cambria Math" panose="02040503050406030204" pitchFamily="18" charset="0"/>
+                            </a:rPr>
+                            <m:t>𝑖</m:t>
+                          </m:r>
+                        </m:sub>
+                      </m:sSub>
+                      <m:r>
+                        <a:rPr lang="en-US" sz="1200" i="0">
+                          <a:latin typeface="Cambria Math" panose="02040503050406030204" pitchFamily="18" charset="0"/>
+                        </a:rPr>
+                        <m:t>=</m:t>
+                      </m:r>
+                      <m:f>
+                        <m:fPr>
+                          <m:ctrlPr>
+                            <a:rPr lang="en-US" sz="1200" i="1">
+                              <a:solidFill>
+                                <a:srgbClr val="836967"/>
+                              </a:solidFill>
+                              <a:latin typeface="Cambria Math" panose="02040503050406030204" pitchFamily="18" charset="0"/>
+                            </a:rPr>
+                          </m:ctrlPr>
+                        </m:fPr>
+                        <m:num>
+                          <m:r>
+                            <a:rPr lang="en-US" sz="1200" i="1">
+                              <a:latin typeface="Cambria Math" panose="02040503050406030204" pitchFamily="18" charset="0"/>
+                            </a:rPr>
+                            <m:t>𝑐</m:t>
+                          </m:r>
+                          <m:rad>
+                            <m:radPr>
+                              <m:degHide m:val="on"/>
+                              <m:ctrlPr>
+                                <a:rPr lang="en-US" sz="1200" i="1">
+                                  <a:solidFill>
+                                    <a:srgbClr val="836967"/>
+                                  </a:solidFill>
+                                  <a:latin typeface="Cambria Math" panose="02040503050406030204" pitchFamily="18" charset="0"/>
+                                </a:rPr>
+                              </m:ctrlPr>
+                            </m:radPr>
+                            <m:deg/>
+                            <m:e>
+                              <m:r>
+                                <a:rPr lang="en-US" sz="1200" i="1">
+                                  <a:latin typeface="Cambria Math" panose="02040503050406030204" pitchFamily="18" charset="0"/>
+                                </a:rPr>
+                                <m:t>𝑛</m:t>
+                              </m:r>
+                            </m:e>
+                          </m:rad>
+                        </m:num>
+                        <m:den>
+                          <m:rad>
+                            <m:radPr>
+                              <m:degHide m:val="on"/>
+                              <m:ctrlPr>
+                                <a:rPr lang="en-US" sz="1200" i="1">
+                                  <a:solidFill>
+                                    <a:srgbClr val="836967"/>
+                                  </a:solidFill>
+                                  <a:latin typeface="Cambria Math" panose="02040503050406030204" pitchFamily="18" charset="0"/>
+                                </a:rPr>
+                              </m:ctrlPr>
+                            </m:radPr>
+                            <m:deg/>
+                            <m:e>
+                              <m:r>
+                                <m:rPr>
+                                  <m:sty m:val="p"/>
+                                </m:rPr>
+                                <a:rPr lang="en-US" sz="1200" i="0">
+                                  <a:latin typeface="Cambria Math" panose="02040503050406030204" pitchFamily="18" charset="0"/>
+                                </a:rPr>
+                                <m:t>max</m:t>
+                              </m:r>
+                              <m:d>
+                                <m:dPr>
+                                  <m:sepChr m:val=","/>
+                                  <m:ctrlPr>
+                                    <a:rPr lang="en-US" sz="1200" i="1">
+                                      <a:latin typeface="Cambria Math" panose="02040503050406030204" pitchFamily="18" charset="0"/>
+                                    </a:rPr>
+                                  </m:ctrlPr>
+                                </m:dPr>
+                                <m:e>
+                                  <m:sSubSup>
+                                    <m:sSubSupPr>
+                                      <m:ctrlPr>
+                                        <a:rPr lang="en-US" sz="1200" i="1">
+                                          <a:solidFill>
+                                            <a:srgbClr val="836967"/>
+                                          </a:solidFill>
+                                          <a:latin typeface="Cambria Math" panose="02040503050406030204" pitchFamily="18" charset="0"/>
+                                        </a:rPr>
+                                      </m:ctrlPr>
+                                    </m:sSubSupPr>
+                                    <m:e>
+                                      <m:r>
+                                        <a:rPr lang="en-US" sz="1200" i="1">
+                                          <a:latin typeface="Cambria Math" panose="02040503050406030204" pitchFamily="18" charset="0"/>
+                                        </a:rPr>
+                                        <m:t>𝜎</m:t>
+                                      </m:r>
+                                    </m:e>
+                                    <m:sub>
+                                      <m:r>
+                                        <a:rPr lang="en-US" sz="1200" i="1">
+                                          <a:latin typeface="Cambria Math" panose="02040503050406030204" pitchFamily="18" charset="0"/>
+                                        </a:rPr>
+                                        <m:t>𝑖</m:t>
+                                      </m:r>
+                                    </m:sub>
+                                    <m:sup>
+                                      <m:r>
+                                        <a:rPr lang="en-US" sz="1200" i="0">
+                                          <a:latin typeface="Cambria Math" panose="02040503050406030204" pitchFamily="18" charset="0"/>
+                                        </a:rPr>
+                                        <m:t>2</m:t>
+                                      </m:r>
+                                    </m:sup>
+                                  </m:sSubSup>
+                                </m:e>
+                                <m:e>
+                                  <m:d>
+                                    <m:dPr>
+                                      <m:ctrlPr>
+                                        <a:rPr lang="en-US" sz="1200" i="1">
+                                          <a:latin typeface="Cambria Math" panose="02040503050406030204" pitchFamily="18" charset="0"/>
+                                        </a:rPr>
+                                      </m:ctrlPr>
+                                    </m:dPr>
+                                    <m:e>
+                                      <m:sSub>
+                                        <m:sSubPr>
+                                          <m:ctrlPr>
+                                            <a:rPr lang="en-US" sz="1200" i="1">
+                                              <a:solidFill>
+                                                <a:srgbClr val="836967"/>
+                                              </a:solidFill>
+                                              <a:latin typeface="Cambria Math" panose="02040503050406030204" pitchFamily="18" charset="0"/>
+                                            </a:rPr>
+                                          </m:ctrlPr>
+                                        </m:sSubPr>
+                                        <m:e>
+                                          <m:r>
+                                            <a:rPr lang="en-US" sz="1200" i="1">
+                                              <a:latin typeface="Cambria Math" panose="02040503050406030204" pitchFamily="18" charset="0"/>
+                                            </a:rPr>
+                                            <m:t>𝑌</m:t>
+                                          </m:r>
+                                        </m:e>
+                                        <m:sub>
+                                          <m:r>
+                                            <a:rPr lang="en-US" sz="1200" i="1">
+                                              <a:latin typeface="Cambria Math" panose="02040503050406030204" pitchFamily="18" charset="0"/>
+                                            </a:rPr>
+                                            <m:t>𝑗</m:t>
+                                          </m:r>
+                                        </m:sub>
+                                      </m:sSub>
+                                    </m:e>
+                                  </m:d>
+                                  <m:r>
+                                    <a:rPr lang="en-US" sz="1200" i="0">
+                                      <a:latin typeface="Cambria Math" panose="02040503050406030204" pitchFamily="18" charset="0"/>
+                                    </a:rPr>
+                                    <m:t>−</m:t>
+                                  </m:r>
+                                  <m:r>
+                                    <a:rPr lang="en-US" sz="1200" i="1">
+                                      <a:latin typeface="Cambria Math" panose="02040503050406030204" pitchFamily="18" charset="0"/>
+                                    </a:rPr>
+                                    <m:t>𝑛</m:t>
+                                  </m:r>
+                                  <m:sSubSup>
+                                    <m:sSubSupPr>
+                                      <m:ctrlPr>
+                                        <a:rPr lang="en-US" sz="1200" i="1">
+                                          <a:solidFill>
+                                            <a:srgbClr val="836967"/>
+                                          </a:solidFill>
+                                          <a:latin typeface="Cambria Math" panose="02040503050406030204" pitchFamily="18" charset="0"/>
+                                        </a:rPr>
+                                      </m:ctrlPr>
+                                    </m:sSubSupPr>
+                                    <m:e>
+                                      <m:r>
+                                        <a:rPr lang="en-US" sz="1200" i="1">
+                                          <a:latin typeface="Cambria Math" panose="02040503050406030204" pitchFamily="18" charset="0"/>
+                                        </a:rPr>
+                                        <m:t>𝜎</m:t>
+                                      </m:r>
+                                    </m:e>
+                                    <m:sub>
+                                      <m:r>
+                                        <a:rPr lang="en-US" sz="1200" i="1">
+                                          <a:latin typeface="Cambria Math" panose="02040503050406030204" pitchFamily="18" charset="0"/>
+                                        </a:rPr>
+                                        <m:t>𝑛</m:t>
+                                      </m:r>
+                                    </m:sub>
+                                    <m:sup>
+                                      <m:r>
+                                        <a:rPr lang="en-US" sz="1200" i="0">
+                                          <a:latin typeface="Cambria Math" panose="02040503050406030204" pitchFamily="18" charset="0"/>
+                                        </a:rPr>
+                                        <m:t>2</m:t>
+                                      </m:r>
+                                    </m:sup>
+                                  </m:sSubSup>
+                                  <m:r>
+                                    <a:rPr lang="en-US" sz="1200" i="0">
+                                      <a:latin typeface="Cambria Math" panose="02040503050406030204" pitchFamily="18" charset="0"/>
+                                    </a:rPr>
+                                    <m:t>0</m:t>
+                                  </m:r>
+                                </m:e>
+                              </m:d>
+                            </m:e>
+                          </m:rad>
+                          <m:r>
+                            <a:rPr lang="en-US" sz="1200" i="0">
+                              <a:latin typeface="Cambria Math" panose="02040503050406030204" pitchFamily="18" charset="0"/>
+                            </a:rPr>
+                            <m:t>+</m:t>
+                          </m:r>
+                          <m:r>
+                            <a:rPr lang="en-US" sz="1200" i="1">
+                              <a:latin typeface="Cambria Math" panose="02040503050406030204" pitchFamily="18" charset="0"/>
+                            </a:rPr>
+                            <m:t>𝜀</m:t>
+                          </m:r>
+                        </m:den>
+                      </m:f>
+                    </m:oMath>
+                  </m:oMathPara>
+                </a14:m>
+                <a:endParaRPr lang="en-US" sz="1200" dirty="0"/>
+              </a:p>
+            </p:txBody>
+          </p:sp>
+        </mc:Choice>
+        <mc:Fallback>
+          <p:sp>
+            <p:nvSpPr>
+              <p:cNvPr id="59" name="תיבת טקסט 58">
+                <a:extLst>
+                  <a:ext uri="{FF2B5EF4-FFF2-40B4-BE49-F238E27FC236}">
+                    <a16:creationId xmlns:a16="http://schemas.microsoft.com/office/drawing/2014/main" id="{855D62F7-25A6-4E74-B237-2EA034F41933}"/>
+                  </a:ext>
+                </a:extLst>
+              </p:cNvPr>
+              <p:cNvSpPr txBox="1">
+                <a:spLocks noRot="1" noChangeAspect="1" noMove="1" noResize="1" noEditPoints="1" noAdjustHandles="1" noChangeArrowheads="1" noChangeShapeType="1" noTextEdit="1"/>
+              </p:cNvSpPr>
+              <p:nvPr/>
+            </p:nvSpPr>
+            <p:spPr>
+              <a:xfrm>
+                <a:off x="5495869" y="4043056"/>
+                <a:ext cx="2783935" cy="695127"/>
+              </a:xfrm>
+              <a:prstGeom prst="rect">
+                <a:avLst/>
+              </a:prstGeom>
+              <a:blipFill>
+                <a:blip r:embed="rId8"/>
+                <a:stretch>
+                  <a:fillRect/>
+                </a:stretch>
+              </a:blipFill>
+            </p:spPr>
+            <p:txBody>
+              <a:bodyPr/>
+              <a:lstStyle/>
+              <a:p>
+                <a:r>
+                  <a:rPr lang="en-US">
+                    <a:noFill/>
+                  </a:rPr>
+                  <a:t> </a:t>
+                </a:r>
+              </a:p>
+            </p:txBody>
+          </p:sp>
+        </mc:Fallback>
+      </mc:AlternateContent>
+      <p:cxnSp>
+        <p:nvCxnSpPr>
+          <p:cNvPr id="63" name="מחבר: מרפקי 62">
+            <a:extLst>
+              <a:ext uri="{FF2B5EF4-FFF2-40B4-BE49-F238E27FC236}">
+                <a16:creationId xmlns:a16="http://schemas.microsoft.com/office/drawing/2014/main" id="{C17075BC-AC74-4498-BF8F-B8E212ABF024}"/>
+              </a:ext>
+            </a:extLst>
+          </p:cNvPr>
+          <p:cNvCxnSpPr>
+            <a:cxnSpLocks/>
+            <a:stCxn id="22" idx="1"/>
+            <a:endCxn id="59" idx="0"/>
+          </p:cNvCxnSpPr>
+          <p:nvPr/>
+        </p:nvCxnSpPr>
+        <p:spPr>
+          <a:xfrm rot="10800000" flipV="1">
+            <a:off x="6887838" y="3720442"/>
+            <a:ext cx="974143" cy="322614"/>
+          </a:xfrm>
+          <a:prstGeom prst="bentConnector2">
+            <a:avLst/>
+          </a:prstGeom>
+          <a:ln w="28575">
+            <a:tailEnd type="triangle"/>
+          </a:ln>
+        </p:spPr>
+        <p:style>
+          <a:lnRef idx="1">
+            <a:schemeClr val="dk1"/>
+          </a:lnRef>
+          <a:fillRef idx="0">
+            <a:schemeClr val="dk1"/>
+          </a:fillRef>
+          <a:effectRef idx="0">
+            <a:schemeClr val="dk1"/>
+          </a:effectRef>
+          <a:fontRef idx="minor">
+            <a:schemeClr val="tx1"/>
+          </a:fontRef>
+        </p:style>
+      </p:cxnSp>
+      <p:cxnSp>
+        <p:nvCxnSpPr>
+          <p:cNvPr id="1028" name="מחבר: מרפקי 1027">
+            <a:extLst>
+              <a:ext uri="{FF2B5EF4-FFF2-40B4-BE49-F238E27FC236}">
+                <a16:creationId xmlns:a16="http://schemas.microsoft.com/office/drawing/2014/main" id="{AC8CFBD1-6DF8-4879-8BDC-09402291B7EB}"/>
+              </a:ext>
+            </a:extLst>
+          </p:cNvPr>
+          <p:cNvCxnSpPr>
+            <a:cxnSpLocks/>
+            <a:stCxn id="59" idx="2"/>
+            <a:endCxn id="79" idx="1"/>
+          </p:cNvCxnSpPr>
+          <p:nvPr/>
+        </p:nvCxnSpPr>
+        <p:spPr>
+          <a:xfrm rot="16200000" flipH="1">
+            <a:off x="7067987" y="4558033"/>
+            <a:ext cx="388534" cy="748834"/>
+          </a:xfrm>
+          <a:prstGeom prst="bentConnector2">
+            <a:avLst/>
+          </a:prstGeom>
+          <a:ln w="28575">
+            <a:tailEnd type="triangle"/>
+          </a:ln>
+        </p:spPr>
+        <p:style>
+          <a:lnRef idx="1">
+            <a:schemeClr val="dk1"/>
+          </a:lnRef>
+          <a:fillRef idx="0">
+            <a:schemeClr val="dk1"/>
+          </a:fillRef>
+          <a:effectRef idx="0">
+            <a:schemeClr val="dk1"/>
+          </a:effectRef>
+          <a:fontRef idx="minor">
+            <a:schemeClr val="tx1"/>
+          </a:fontRef>
+        </p:style>
+      </p:cxnSp>
+      <p:cxnSp>
+        <p:nvCxnSpPr>
+          <p:cNvPr id="1030" name="מחבר: מרפקי 1029">
+            <a:extLst>
+              <a:ext uri="{FF2B5EF4-FFF2-40B4-BE49-F238E27FC236}">
+                <a16:creationId xmlns:a16="http://schemas.microsoft.com/office/drawing/2014/main" id="{0030238C-FCFE-41DA-8939-50752FBD563E}"/>
+              </a:ext>
+            </a:extLst>
+          </p:cNvPr>
+          <p:cNvCxnSpPr>
+            <a:stCxn id="22" idx="3"/>
+            <a:endCxn id="55" idx="0"/>
+          </p:cNvCxnSpPr>
+          <p:nvPr/>
+        </p:nvCxnSpPr>
+        <p:spPr>
+          <a:xfrm>
+            <a:off x="8945561" y="3720442"/>
+            <a:ext cx="952284" cy="480306"/>
+          </a:xfrm>
+          <a:prstGeom prst="bentConnector2">
+            <a:avLst/>
+          </a:prstGeom>
+          <a:ln w="28575">
+            <a:tailEnd type="triangle"/>
+          </a:ln>
+        </p:spPr>
+        <p:style>
+          <a:lnRef idx="1">
+            <a:schemeClr val="dk1"/>
+          </a:lnRef>
+          <a:fillRef idx="0">
+            <a:schemeClr val="dk1"/>
+          </a:fillRef>
+          <a:effectRef idx="0">
+            <a:schemeClr val="dk1"/>
+          </a:effectRef>
+          <a:fontRef idx="minor">
+            <a:schemeClr val="tx1"/>
+          </a:fontRef>
+        </p:style>
+      </p:cxnSp>
+      <p:cxnSp>
+        <p:nvCxnSpPr>
+          <p:cNvPr id="1032" name="מחבר: מרפקי 1031">
+            <a:extLst>
+              <a:ext uri="{FF2B5EF4-FFF2-40B4-BE49-F238E27FC236}">
+                <a16:creationId xmlns:a16="http://schemas.microsoft.com/office/drawing/2014/main" id="{556FA664-E905-43BA-B0E9-4486ACE2C543}"/>
+              </a:ext>
+            </a:extLst>
+          </p:cNvPr>
+          <p:cNvCxnSpPr>
+            <a:cxnSpLocks/>
+            <a:stCxn id="55" idx="2"/>
+            <a:endCxn id="79" idx="3"/>
+          </p:cNvCxnSpPr>
+          <p:nvPr/>
+        </p:nvCxnSpPr>
+        <p:spPr>
+          <a:xfrm rot="5400000">
+            <a:off x="9256039" y="4484910"/>
+            <a:ext cx="556637" cy="726976"/>
+          </a:xfrm>
+          <a:prstGeom prst="bentConnector2">
+            <a:avLst/>
+          </a:prstGeom>
+          <a:ln w="28575">
+            <a:tailEnd type="triangle"/>
+          </a:ln>
+        </p:spPr>
+        <p:style>
+          <a:lnRef idx="1">
+            <a:schemeClr val="dk1"/>
+          </a:lnRef>
+          <a:fillRef idx="0">
+            <a:schemeClr val="dk1"/>
+          </a:fillRef>
+          <a:effectRef idx="0">
+            <a:schemeClr val="dk1"/>
+          </a:effectRef>
+          <a:fontRef idx="minor">
+            <a:schemeClr val="tx1"/>
+          </a:fontRef>
+        </p:style>
+      </p:cxnSp>
+      <mc:AlternateContent xmlns:mc="http://schemas.openxmlformats.org/markup-compatibility/2006">
+        <mc:Choice xmlns:a14="http://schemas.microsoft.com/office/drawing/2010/main" Requires="a14">
+          <p:sp>
+            <p:nvSpPr>
+              <p:cNvPr id="76" name="תיבת טקסט 75">
+                <a:extLst>
+                  <a:ext uri="{FF2B5EF4-FFF2-40B4-BE49-F238E27FC236}">
+                    <a16:creationId xmlns:a16="http://schemas.microsoft.com/office/drawing/2014/main" id="{3979BEA6-119A-4A05-A93A-5A0C74D52F8E}"/>
+                  </a:ext>
+                </a:extLst>
+              </p:cNvPr>
+              <p:cNvSpPr txBox="1"/>
+              <p:nvPr/>
+            </p:nvSpPr>
+            <p:spPr>
+              <a:xfrm>
+                <a:off x="7861980" y="5897751"/>
+                <a:ext cx="1083581" cy="405432"/>
+              </a:xfrm>
+              <a:prstGeom prst="rect">
+                <a:avLst/>
+              </a:prstGeom>
+              <a:noFill/>
+            </p:spPr>
+            <p:txBody>
+              <a:bodyPr wrap="square">
+                <a:spAutoFit/>
+              </a:bodyPr>
+              <a:lstStyle/>
+              <a:p>
+                <a:pPr/>
+                <a14:m>
+                  <m:oMathPara xmlns:m="http://schemas.openxmlformats.org/officeDocument/2006/math">
+                    <m:oMathParaPr>
+                      <m:jc m:val="centerGroup"/>
+                    </m:oMathParaPr>
+                    <m:oMath xmlns:m="http://schemas.openxmlformats.org/officeDocument/2006/math">
+                      <m:sSub>
+                        <m:sSubPr>
+                          <m:ctrlPr>
+                            <a:rPr lang="en-US" i="1" smtClean="0">
+                              <a:solidFill>
+                                <a:schemeClr val="tx1"/>
+                              </a:solidFill>
+                              <a:latin typeface="Cambria Math" panose="02040503050406030204" pitchFamily="18" charset="0"/>
+                            </a:rPr>
+                          </m:ctrlPr>
+                        </m:sSubPr>
+                        <m:e>
+                          <m:acc>
+                            <m:accPr>
+                              <m:chr m:val="̂"/>
+                              <m:ctrlPr>
+                                <a:rPr lang="en-US" i="1">
+                                  <a:solidFill>
+                                    <a:schemeClr val="tx1"/>
+                                  </a:solidFill>
+                                  <a:latin typeface="Cambria Math" panose="02040503050406030204" pitchFamily="18" charset="0"/>
+                                </a:rPr>
+                              </m:ctrlPr>
+                            </m:accPr>
+                            <m:e>
+                              <m:r>
+                                <a:rPr lang="en-US" i="1">
+                                  <a:solidFill>
+                                    <a:schemeClr val="tx1"/>
+                                  </a:solidFill>
+                                  <a:latin typeface="Cambria Math" panose="02040503050406030204" pitchFamily="18" charset="0"/>
+                                </a:rPr>
+                                <m:t>𝑋</m:t>
+                              </m:r>
+                            </m:e>
+                          </m:acc>
+                        </m:e>
+                        <m:sub>
+                          <m:r>
+                            <a:rPr lang="en-US" i="1">
+                              <a:solidFill>
+                                <a:schemeClr val="tx1"/>
+                              </a:solidFill>
+                              <a:latin typeface="Cambria Math" panose="02040503050406030204" pitchFamily="18" charset="0"/>
+                            </a:rPr>
+                            <m:t>𝑖</m:t>
+                          </m:r>
+                        </m:sub>
+                      </m:sSub>
+                      <m:r>
+                        <a:rPr lang="en-US" i="1">
+                          <a:solidFill>
+                            <a:schemeClr val="tx1"/>
+                          </a:solidFill>
+                          <a:latin typeface="Cambria Math" panose="02040503050406030204" pitchFamily="18" charset="0"/>
+                        </a:rPr>
+                        <m:t>⋯</m:t>
+                      </m:r>
+                      <m:sSub>
+                        <m:sSubPr>
+                          <m:ctrlPr>
+                            <a:rPr lang="en-US" i="1">
+                              <a:solidFill>
+                                <a:schemeClr val="tx1"/>
+                              </a:solidFill>
+                              <a:latin typeface="Cambria Math" panose="02040503050406030204" pitchFamily="18" charset="0"/>
+                            </a:rPr>
+                          </m:ctrlPr>
+                        </m:sSubPr>
+                        <m:e>
+                          <m:acc>
+                            <m:accPr>
+                              <m:chr m:val="̂"/>
+                              <m:ctrlPr>
+                                <a:rPr lang="en-US" i="1">
+                                  <a:solidFill>
+                                    <a:schemeClr val="tx1"/>
+                                  </a:solidFill>
+                                  <a:latin typeface="Cambria Math" panose="02040503050406030204" pitchFamily="18" charset="0"/>
+                                </a:rPr>
+                              </m:ctrlPr>
+                            </m:accPr>
+                            <m:e>
+                              <m:r>
+                                <a:rPr lang="en-US" i="1">
+                                  <a:solidFill>
+                                    <a:schemeClr val="tx1"/>
+                                  </a:solidFill>
+                                  <a:latin typeface="Cambria Math" panose="02040503050406030204" pitchFamily="18" charset="0"/>
+                                </a:rPr>
+                                <m:t>𝑋</m:t>
+                              </m:r>
+                            </m:e>
+                          </m:acc>
+                        </m:e>
+                        <m:sub>
+                          <m:r>
+                            <a:rPr lang="en-US" i="1">
+                              <a:solidFill>
+                                <a:schemeClr val="tx1"/>
+                              </a:solidFill>
+                              <a:latin typeface="Cambria Math" panose="02040503050406030204" pitchFamily="18" charset="0"/>
+                            </a:rPr>
+                            <m:t>𝑗</m:t>
+                          </m:r>
+                        </m:sub>
+                      </m:sSub>
+                    </m:oMath>
+                  </m:oMathPara>
+                </a14:m>
+                <a:endParaRPr lang="en-US" i="1" dirty="0">
+                  <a:solidFill>
+                    <a:schemeClr val="tx1"/>
+                  </a:solidFill>
+                  <a:latin typeface="Cambria Math" panose="02040503050406030204" pitchFamily="18" charset="0"/>
+                </a:endParaRPr>
+              </a:p>
+            </p:txBody>
+          </p:sp>
+        </mc:Choice>
+        <mc:Fallback>
+          <p:sp>
+            <p:nvSpPr>
+              <p:cNvPr id="76" name="תיבת טקסט 75">
+                <a:extLst>
+                  <a:ext uri="{FF2B5EF4-FFF2-40B4-BE49-F238E27FC236}">
+                    <a16:creationId xmlns:a16="http://schemas.microsoft.com/office/drawing/2014/main" id="{3979BEA6-119A-4A05-A93A-5A0C74D52F8E}"/>
+                  </a:ext>
+                </a:extLst>
+              </p:cNvPr>
+              <p:cNvSpPr txBox="1">
+                <a:spLocks noRot="1" noChangeAspect="1" noMove="1" noResize="1" noEditPoints="1" noAdjustHandles="1" noChangeArrowheads="1" noChangeShapeType="1" noTextEdit="1"/>
+              </p:cNvSpPr>
+              <p:nvPr/>
+            </p:nvSpPr>
+            <p:spPr>
+              <a:xfrm>
+                <a:off x="7861980" y="5897751"/>
+                <a:ext cx="1083581" cy="405432"/>
+              </a:xfrm>
+              <a:prstGeom prst="rect">
+                <a:avLst/>
+              </a:prstGeom>
+              <a:blipFill>
+                <a:blip r:embed="rId9"/>
+                <a:stretch>
+                  <a:fillRect r="-9605" b="-7463"/>
+                </a:stretch>
+              </a:blipFill>
+            </p:spPr>
+            <p:txBody>
+              <a:bodyPr/>
+              <a:lstStyle/>
+              <a:p>
+                <a:r>
+                  <a:rPr lang="en-US">
+                    <a:noFill/>
+                  </a:rPr>
+                  <a:t> </a:t>
+                </a:r>
+              </a:p>
+            </p:txBody>
+          </p:sp>
+        </mc:Fallback>
+      </mc:AlternateContent>
+      <p:sp>
+        <p:nvSpPr>
+          <p:cNvPr id="79" name="תיבת טקסט 78">
+            <a:extLst>
+              <a:ext uri="{FF2B5EF4-FFF2-40B4-BE49-F238E27FC236}">
+                <a16:creationId xmlns:a16="http://schemas.microsoft.com/office/drawing/2014/main" id="{BEC151B6-C331-452C-83B6-B8000D557040}"/>
+              </a:ext>
+            </a:extLst>
+          </p:cNvPr>
+          <p:cNvSpPr txBox="1"/>
+          <p:nvPr/>
+        </p:nvSpPr>
+        <p:spPr>
+          <a:xfrm>
+            <a:off x="7636671" y="4942051"/>
+            <a:ext cx="1534198" cy="369332"/>
+          </a:xfrm>
+          <a:prstGeom prst="rect">
+            <a:avLst/>
+          </a:prstGeom>
+          <a:noFill/>
+        </p:spPr>
+        <p:txBody>
+          <a:bodyPr wrap="square" rtlCol="0">
+            <a:spAutoFit/>
+          </a:bodyPr>
+          <a:lstStyle/>
+          <a:p>
+            <a:pPr algn="ctr"/>
+            <a:r>
+              <a:rPr lang="en-US" dirty="0"/>
+              <a:t>Soft Threshold</a:t>
+            </a:r>
+          </a:p>
+        </p:txBody>
+      </p:sp>
+      <p:cxnSp>
+        <p:nvCxnSpPr>
+          <p:cNvPr id="1043" name="מחבר: מרפקי 1042">
+            <a:extLst>
+              <a:ext uri="{FF2B5EF4-FFF2-40B4-BE49-F238E27FC236}">
+                <a16:creationId xmlns:a16="http://schemas.microsoft.com/office/drawing/2014/main" id="{34FCFD54-9661-4A03-9051-D5708979FD10}"/>
+              </a:ext>
+            </a:extLst>
+          </p:cNvPr>
+          <p:cNvCxnSpPr>
+            <a:stCxn id="79" idx="2"/>
+            <a:endCxn id="76" idx="0"/>
+          </p:cNvCxnSpPr>
+          <p:nvPr/>
+        </p:nvCxnSpPr>
+        <p:spPr>
+          <a:xfrm rot="16200000" flipH="1">
+            <a:off x="8110586" y="5604566"/>
+            <a:ext cx="586368" cy="1"/>
+          </a:xfrm>
+          <a:prstGeom prst="bentConnector3">
+            <a:avLst/>
+          </a:prstGeom>
+          <a:ln w="28575">
+            <a:tailEnd type="triangle"/>
+          </a:ln>
+        </p:spPr>
+        <p:style>
+          <a:lnRef idx="1">
+            <a:schemeClr val="dk1"/>
+          </a:lnRef>
+          <a:fillRef idx="0">
+            <a:schemeClr val="dk1"/>
+          </a:fillRef>
+          <a:effectRef idx="0">
+            <a:schemeClr val="dk1"/>
+          </a:effectRef>
+          <a:fontRef idx="minor">
+            <a:schemeClr val="tx1"/>
+          </a:fontRef>
+        </p:style>
+      </p:cxnSp>
+      <p:pic>
+        <p:nvPicPr>
+          <p:cNvPr id="1045" name="תמונה 1044">
+            <a:extLst>
+              <a:ext uri="{FF2B5EF4-FFF2-40B4-BE49-F238E27FC236}">
+                <a16:creationId xmlns:a16="http://schemas.microsoft.com/office/drawing/2014/main" id="{E3147016-E793-4CBE-9C70-41B69FB6C4B0}"/>
+              </a:ext>
+            </a:extLst>
+          </p:cNvPr>
+          <p:cNvPicPr>
+            <a:picLocks noChangeAspect="1"/>
+          </p:cNvPicPr>
+          <p:nvPr/>
+        </p:nvPicPr>
+        <p:blipFill rotWithShape="1">
+          <a:blip r:embed="rId10"/>
+          <a:srcRect t="15549"/>
+          <a:stretch/>
+        </p:blipFill>
+        <p:spPr>
+          <a:xfrm rot="16200000">
+            <a:off x="9800146" y="4040438"/>
+            <a:ext cx="1934720" cy="711843"/>
+          </a:xfrm>
+          <a:prstGeom prst="rect">
+            <a:avLst/>
+          </a:prstGeom>
+        </p:spPr>
+      </p:pic>
+      <p:sp>
+        <p:nvSpPr>
+          <p:cNvPr id="1046" name="מלבן 1045">
+            <a:extLst>
+              <a:ext uri="{FF2B5EF4-FFF2-40B4-BE49-F238E27FC236}">
+                <a16:creationId xmlns:a16="http://schemas.microsoft.com/office/drawing/2014/main" id="{8FB675A4-CFF9-405B-AEC4-4854EE6DC823}"/>
+              </a:ext>
+            </a:extLst>
+          </p:cNvPr>
+          <p:cNvSpPr/>
+          <p:nvPr/>
+        </p:nvSpPr>
+        <p:spPr>
+          <a:xfrm>
+            <a:off x="10395458" y="4360649"/>
+            <a:ext cx="744096" cy="352768"/>
+          </a:xfrm>
+          <a:prstGeom prst="rect">
+            <a:avLst/>
+          </a:prstGeom>
+          <a:solidFill>
+            <a:schemeClr val="bg1"/>
+          </a:solidFill>
+          <a:ln>
+            <a:solidFill>
+              <a:schemeClr val="bg1"/>
+            </a:solidFill>
+          </a:ln>
+        </p:spPr>
+        <p:style>
+          <a:lnRef idx="2">
+            <a:schemeClr val="accent1">
+              <a:shade val="50000"/>
+            </a:schemeClr>
+          </a:lnRef>
+          <a:fillRef idx="1">
+            <a:schemeClr val="accent1"/>
+          </a:fillRef>
+          <a:effectRef idx="0">
+            <a:schemeClr val="accent1"/>
+          </a:effectRef>
+          <a:fontRef idx="minor">
+            <a:schemeClr val="lt1"/>
+          </a:fontRef>
+        </p:style>
+        <p:txBody>
+          <a:bodyPr rtlCol="0" anchor="ctr"/>
+          <a:lstStyle/>
+          <a:p>
+            <a:pPr algn="ctr"/>
+            <a:endParaRPr lang="en-US">
+              <a:ln>
+                <a:solidFill>
+                  <a:schemeClr val="bg1"/>
+                </a:solidFill>
+              </a:ln>
+              <a:solidFill>
+                <a:schemeClr val="bg1"/>
+              </a:solidFill>
+            </a:endParaRPr>
+          </a:p>
+        </p:txBody>
+      </p:sp>
+      <p:sp>
+        <p:nvSpPr>
+          <p:cNvPr id="1047" name="מלבן 1046">
+            <a:extLst>
+              <a:ext uri="{FF2B5EF4-FFF2-40B4-BE49-F238E27FC236}">
+                <a16:creationId xmlns:a16="http://schemas.microsoft.com/office/drawing/2014/main" id="{36E2D785-27AF-4C02-AD29-EAD6B80D4DD6}"/>
+              </a:ext>
+            </a:extLst>
+          </p:cNvPr>
+          <p:cNvSpPr/>
+          <p:nvPr/>
+        </p:nvSpPr>
+        <p:spPr>
+          <a:xfrm>
+            <a:off x="10908804" y="4790440"/>
+            <a:ext cx="236881" cy="434340"/>
+          </a:xfrm>
+          <a:prstGeom prst="rect">
+            <a:avLst/>
+          </a:prstGeom>
+          <a:solidFill>
+            <a:schemeClr val="bg1"/>
+          </a:solidFill>
+          <a:ln>
+            <a:solidFill>
+              <a:schemeClr val="bg1"/>
+            </a:solidFill>
+          </a:ln>
+        </p:spPr>
+        <p:style>
+          <a:lnRef idx="2">
+            <a:schemeClr val="accent1">
+              <a:shade val="50000"/>
+            </a:schemeClr>
+          </a:lnRef>
+          <a:fillRef idx="1">
+            <a:schemeClr val="accent1"/>
+          </a:fillRef>
+          <a:effectRef idx="0">
+            <a:schemeClr val="accent1"/>
+          </a:effectRef>
+          <a:fontRef idx="minor">
+            <a:schemeClr val="lt1"/>
+          </a:fontRef>
+        </p:style>
+        <p:txBody>
+          <a:bodyPr rtlCol="0" anchor="ctr"/>
+          <a:lstStyle/>
+          <a:p>
+            <a:pPr algn="ctr"/>
+            <a:endParaRPr lang="en-US"/>
+          </a:p>
+        </p:txBody>
+      </p:sp>
+      <p:cxnSp>
+        <p:nvCxnSpPr>
+          <p:cNvPr id="1049" name="מחבר חץ ישר 1048">
+            <a:extLst>
+              <a:ext uri="{FF2B5EF4-FFF2-40B4-BE49-F238E27FC236}">
+                <a16:creationId xmlns:a16="http://schemas.microsoft.com/office/drawing/2014/main" id="{4305FA37-02AC-4C1D-B820-FAC0AA2A4A82}"/>
+              </a:ext>
+            </a:extLst>
+          </p:cNvPr>
+          <p:cNvCxnSpPr/>
+          <p:nvPr/>
+        </p:nvCxnSpPr>
+        <p:spPr>
+          <a:xfrm>
+            <a:off x="10698480" y="4315460"/>
+            <a:ext cx="0" cy="365760"/>
+          </a:xfrm>
+          <a:prstGeom prst="straightConnector1">
+            <a:avLst/>
+          </a:prstGeom>
+          <a:ln>
+            <a:solidFill>
+              <a:schemeClr val="accent2">
+                <a:lumMod val="75000"/>
+              </a:schemeClr>
+            </a:solidFill>
+            <a:tailEnd type="triangle"/>
+          </a:ln>
+        </p:spPr>
+        <p:style>
+          <a:lnRef idx="2">
+            <a:schemeClr val="accent1"/>
+          </a:lnRef>
+          <a:fillRef idx="0">
+            <a:schemeClr val="accent1"/>
+          </a:fillRef>
+          <a:effectRef idx="1">
+            <a:schemeClr val="accent1"/>
+          </a:effectRef>
+          <a:fontRef idx="minor">
+            <a:schemeClr val="tx1"/>
+          </a:fontRef>
+        </p:style>
+      </p:cxnSp>
     </p:spTree>
     <p:extLst>
       <p:ext uri="{BB962C8B-B14F-4D97-AF65-F5344CB8AC3E}">

</xml_diff>